<commit_message>
Changes to presentation video
</commit_message>
<xml_diff>
--- a/Demo Video & Presentation/Slides.pptx
+++ b/Demo Video & Presentation/Slides.pptx
@@ -8,10 +8,11 @@
     <p:sldId id="256" r:id="rId2"/>
     <p:sldId id="257" r:id="rId3"/>
     <p:sldId id="258" r:id="rId4"/>
-    <p:sldId id="259" r:id="rId5"/>
-    <p:sldId id="262" r:id="rId6"/>
-    <p:sldId id="260" r:id="rId7"/>
-    <p:sldId id="261" r:id="rId8"/>
+    <p:sldId id="263" r:id="rId5"/>
+    <p:sldId id="259" r:id="rId6"/>
+    <p:sldId id="262" r:id="rId7"/>
+    <p:sldId id="260" r:id="rId8"/>
+    <p:sldId id="261" r:id="rId9"/>
   </p:sldIdLst>
   <p:sldSz cx="12192000" cy="6858000"/>
   <p:notesSz cx="6858000" cy="9144000"/>
@@ -485,7 +486,7 @@
           <a:p>
             <a:fld id="{48A87A34-81AB-432B-8DAE-1953F412C126}" type="datetimeFigureOut">
               <a:rPr lang="en-US" smtClean="0"/>
-              <a:t>4/23/2020</a:t>
+              <a:t>5/6/2020</a:t>
             </a:fld>
             <a:endParaRPr lang="en-US" dirty="0"/>
           </a:p>
@@ -732,7 +733,7 @@
           <a:p>
             <a:fld id="{48A87A34-81AB-432B-8DAE-1953F412C126}" type="datetimeFigureOut">
               <a:rPr lang="en-US" smtClean="0"/>
-              <a:t>4/23/2020</a:t>
+              <a:t>5/6/2020</a:t>
             </a:fld>
             <a:endParaRPr lang="en-US" dirty="0"/>
           </a:p>
@@ -1118,7 +1119,7 @@
           <a:p>
             <a:fld id="{48A87A34-81AB-432B-8DAE-1953F412C126}" type="datetimeFigureOut">
               <a:rPr lang="en-US" smtClean="0"/>
-              <a:t>4/23/2020</a:t>
+              <a:t>5/6/2020</a:t>
             </a:fld>
             <a:endParaRPr lang="en-US" dirty="0"/>
           </a:p>
@@ -1347,7 +1348,7 @@
           <a:p>
             <a:fld id="{48A87A34-81AB-432B-8DAE-1953F412C126}" type="datetimeFigureOut">
               <a:rPr lang="en-US" smtClean="0"/>
-              <a:t>4/23/2020</a:t>
+              <a:t>5/6/2020</a:t>
             </a:fld>
             <a:endParaRPr lang="en-US" dirty="0"/>
           </a:p>
@@ -1838,7 +1839,7 @@
           <a:p>
             <a:fld id="{48A87A34-81AB-432B-8DAE-1953F412C126}" type="datetimeFigureOut">
               <a:rPr lang="en-US" smtClean="0"/>
-              <a:t>4/23/2020</a:t>
+              <a:t>5/6/2020</a:t>
             </a:fld>
             <a:endParaRPr lang="en-US" dirty="0"/>
           </a:p>
@@ -2148,7 +2149,7 @@
           <a:p>
             <a:fld id="{48A87A34-81AB-432B-8DAE-1953F412C126}" type="datetimeFigureOut">
               <a:rPr lang="en-US" smtClean="0"/>
-              <a:t>4/23/2020</a:t>
+              <a:t>5/6/2020</a:t>
             </a:fld>
             <a:endParaRPr lang="en-US" dirty="0"/>
           </a:p>
@@ -2539,7 +2540,7 @@
           <a:p>
             <a:fld id="{48A87A34-81AB-432B-8DAE-1953F412C126}" type="datetimeFigureOut">
               <a:rPr lang="en-US" smtClean="0"/>
-              <a:t>4/23/2020</a:t>
+              <a:t>5/6/2020</a:t>
             </a:fld>
             <a:endParaRPr lang="en-US" dirty="0"/>
           </a:p>
@@ -2657,7 +2658,7 @@
           <a:p>
             <a:fld id="{48A87A34-81AB-432B-8DAE-1953F412C126}" type="datetimeFigureOut">
               <a:rPr lang="en-US" smtClean="0"/>
-              <a:t>4/23/2020</a:t>
+              <a:t>5/6/2020</a:t>
             </a:fld>
             <a:endParaRPr lang="en-US" dirty="0"/>
           </a:p>
@@ -2752,7 +2753,7 @@
           <a:p>
             <a:fld id="{48A87A34-81AB-432B-8DAE-1953F412C126}" type="datetimeFigureOut">
               <a:rPr lang="en-US" smtClean="0"/>
-              <a:t>4/23/2020</a:t>
+              <a:t>5/6/2020</a:t>
             </a:fld>
             <a:endParaRPr lang="en-US" dirty="0"/>
           </a:p>
@@ -3052,7 +3053,7 @@
           <a:p>
             <a:fld id="{48A87A34-81AB-432B-8DAE-1953F412C126}" type="datetimeFigureOut">
               <a:rPr lang="en-US" smtClean="0"/>
-              <a:t>4/23/2020</a:t>
+              <a:t>5/6/2020</a:t>
             </a:fld>
             <a:endParaRPr lang="en-US" dirty="0"/>
           </a:p>
@@ -3318,7 +3319,7 @@
             <a:fld id="{48A87A34-81AB-432B-8DAE-1953F412C126}" type="datetimeFigureOut">
               <a:rPr lang="en-US" smtClean="0"/>
               <a:pPr/>
-              <a:t>4/23/2020</a:t>
+              <a:t>5/6/2020</a:t>
             </a:fld>
             <a:endParaRPr lang="en-US" dirty="0"/>
           </a:p>
@@ -3742,7 +3743,7 @@
             <a:fld id="{48A87A34-81AB-432B-8DAE-1953F412C126}" type="datetimeFigureOut">
               <a:rPr lang="en-US" smtClean="0"/>
               <a:pPr/>
-              <a:t>4/23/2020</a:t>
+              <a:t>5/6/2020</a:t>
             </a:fld>
             <a:endParaRPr lang="en-US" dirty="0"/>
           </a:p>
@@ -5939,7 +5940,7 @@
         </p:spPr>
         <p:txBody>
           <a:bodyPr anchor="ctr">
-            <a:normAutofit lnSpcReduction="10000"/>
+            <a:normAutofit/>
           </a:bodyPr>
           <a:lstStyle/>
           <a:p>
@@ -5947,60 +5948,33 @@
               <a:buNone/>
             </a:pPr>
             <a:r>
-              <a:rPr lang="en-GB" dirty="0"/>
+              <a:rPr lang="en-GB" sz="3600" dirty="0"/>
               <a:t>Context</a:t>
             </a:r>
           </a:p>
           <a:p>
             <a:r>
-              <a:rPr lang="en-GB" sz="1400" dirty="0"/>
-              <a:t>The project is a training simulation to train ticket inspectors with conflict resolution. We use Unity, Azure Speech to Text and Text to Speech along with AIML bots and all of this is built to the Oculus Quest(VR) to give the user a realistic experience. The reason this application is important for ICSE Security is to reduce the cost of their current training program. Currently, when training Luas ticket inspectors, they must close a Luas track in Dublin and hire actors to be passengers. This costs a lot of money and is not repeatable on a daily basis. So that is the problem that this project attempts to fix.</a:t>
-            </a:r>
-          </a:p>
-          <a:p>
-            <a:pPr marL="0" indent="0">
-              <a:buNone/>
-            </a:pPr>
-            <a:r>
-              <a:rPr lang="en-GB" dirty="0"/>
-              <a:t>Goals / Objectives</a:t>
-            </a:r>
-          </a:p>
-          <a:p>
-            <a:r>
-              <a:rPr lang="en-GB" sz="1400" b="0" i="0" dirty="0">
-                <a:effectLst/>
-                <a:cs typeface="Arial" panose="020B0604020202020204" pitchFamily="34" charset="0"/>
-              </a:rPr>
-              <a:t>To make sure that we, as developers, understood the requirements of the client to help us develop a system that the client was content with.</a:t>
-            </a:r>
-          </a:p>
-          <a:p>
-            <a:r>
-              <a:rPr lang="en-GB" sz="1400" b="0" i="0" dirty="0">
-                <a:effectLst/>
-              </a:rPr>
-              <a:t>To research the latest technology to aid in creating an application that would not be out-dated and that it was as efficient as possible for the time.</a:t>
-            </a:r>
-          </a:p>
-          <a:p>
-            <a:r>
-              <a:rPr lang="en-GB" sz="1400" b="0" i="0" dirty="0">
-                <a:effectLst/>
-              </a:rPr>
-              <a:t>To Implement a robust system architecture what we have learnt from our research of the latest technologies.</a:t>
-            </a:r>
-          </a:p>
-          <a:p>
-            <a:r>
-              <a:rPr lang="en-GB" sz="1400" b="0" i="0" dirty="0">
-                <a:effectLst/>
-              </a:rPr>
-              <a:t>To create an application that we, as developers, were happy with but more importantly, creating a product that met the requirements of our client.</a:t>
-            </a:r>
-            <a:endParaRPr lang="en-GB" sz="1600" dirty="0">
-              <a:cs typeface="Arial" panose="020B0604020202020204" pitchFamily="34" charset="0"/>
-            </a:endParaRPr>
+              <a:rPr lang="en-GB" sz="1800" dirty="0"/>
+              <a:t>The project is a training simulation to train ticket inspectors with conflict resolution. </a:t>
+            </a:r>
+          </a:p>
+          <a:p>
+            <a:r>
+              <a:rPr lang="en-GB" sz="1800" dirty="0"/>
+              <a:t>We use Unity, Azure Speech to Text and Text to Speech along with AIML bots and all of this is built to the Oculus Quest(VR) to give the user a realistic experience. </a:t>
+            </a:r>
+          </a:p>
+          <a:p>
+            <a:r>
+              <a:rPr lang="en-GB" sz="1800" dirty="0"/>
+              <a:t>The reason this application is important for ICSE Security is to reduce the cost of their current training program. </a:t>
+            </a:r>
+          </a:p>
+          <a:p>
+            <a:r>
+              <a:rPr lang="en-GB" sz="1800" dirty="0"/>
+              <a:t>They must close a Luas track in Dublin and hire actors to be passengers. This costs a lot of money and is not repeatable on a daily basis.</a:t>
+            </a:r>
           </a:p>
         </p:txBody>
       </p:sp>
@@ -6109,23 +6083,24 @@
         </p:nvSpPr>
         <p:spPr>
           <a:xfrm>
-            <a:off x="762000" y="559678"/>
-            <a:ext cx="3833906" cy="1759316"/>
+            <a:off x="643467" y="643466"/>
+            <a:ext cx="3933390" cy="4937287"/>
           </a:xfrm>
         </p:spPr>
         <p:txBody>
-          <a:bodyPr>
+          <a:bodyPr anchor="ctr">
             <a:normAutofit/>
           </a:bodyPr>
           <a:lstStyle/>
           <a:p>
-            <a:r>
-              <a:rPr lang="en-GB" sz="4000">
+            <a:pPr algn="l"/>
+            <a:r>
+              <a:rPr lang="en-GB" sz="4800" dirty="0">
                 <a:solidFill>
                   <a:schemeClr val="tx1"/>
                 </a:solidFill>
               </a:rPr>
-              <a:t>System Design</a:t>
+              <a:t>Project Overview</a:t>
             </a:r>
           </a:p>
         </p:txBody>
@@ -6142,13 +6117,13 @@
         </p:nvSpPr>
         <p:spPr>
           <a:xfrm>
-            <a:off x="761999" y="1512420"/>
-            <a:ext cx="6534539" cy="4039294"/>
+            <a:off x="4812336" y="643466"/>
+            <a:ext cx="6593180" cy="4937287"/>
           </a:xfrm>
         </p:spPr>
         <p:txBody>
-          <a:bodyPr>
-            <a:normAutofit fontScale="92500" lnSpcReduction="10000"/>
+          <a:bodyPr anchor="ctr">
+            <a:normAutofit/>
           </a:bodyPr>
           <a:lstStyle/>
           <a:p>
@@ -6156,357 +6131,52 @@
               <a:buNone/>
             </a:pPr>
             <a:r>
-              <a:rPr lang="en-GB" sz="1600" dirty="0">
-                <a:solidFill>
-                  <a:schemeClr val="tx1"/>
-                </a:solidFill>
+              <a:rPr lang="en-GB" sz="3200" dirty="0"/>
+              <a:t>Goals / Objectives</a:t>
+            </a:r>
+          </a:p>
+          <a:p>
+            <a:r>
+              <a:rPr lang="en-GB" sz="1800" b="0" i="0" dirty="0">
+                <a:effectLst/>
+                <a:cs typeface="Arial" panose="020B0604020202020204" pitchFamily="34" charset="0"/>
               </a:rPr>
-              <a:t>Here you can see a UML diagram of the system’s architecture and the flow of data. I will go through all 6 steps that happens each time you speak to a bot in the training simulation. </a:t>
-            </a:r>
-          </a:p>
-          <a:p>
-            <a:pPr marL="342900" indent="-342900">
-              <a:buFont typeface="+mj-lt"/>
-              <a:buAutoNum type="arabicPeriod"/>
-            </a:pPr>
-            <a:r>
-              <a:rPr lang="en-GB" sz="1600" dirty="0">
-                <a:solidFill>
-                  <a:schemeClr val="tx1"/>
-                </a:solidFill>
+              <a:t>To make sure that we, as developers, understood the requirements of the client to help us develop a system that the client was content with.</a:t>
+            </a:r>
+          </a:p>
+          <a:p>
+            <a:r>
+              <a:rPr lang="en-GB" sz="1800" b="0" i="0" dirty="0">
+                <a:effectLst/>
               </a:rPr>
-              <a:t>The user speaks and the data is sent to Azure to be converted to text.</a:t>
-            </a:r>
-          </a:p>
-          <a:p>
-            <a:pPr marL="342900" indent="-342900">
-              <a:buFont typeface="+mj-lt"/>
-              <a:buAutoNum type="arabicPeriod"/>
-            </a:pPr>
-            <a:r>
-              <a:rPr lang="en-GB" sz="1600" dirty="0">
-                <a:solidFill>
-                  <a:schemeClr val="tx1"/>
-                </a:solidFill>
+              <a:t>To research the latest technology to aid in creating an application that would not be out-dated and that it was as efficient as possible for the time.</a:t>
+            </a:r>
+          </a:p>
+          <a:p>
+            <a:r>
+              <a:rPr lang="en-GB" sz="1800" b="0" i="0" dirty="0">
+                <a:effectLst/>
               </a:rPr>
-              <a:t>That text is returned to the Unity client.</a:t>
-            </a:r>
-          </a:p>
-          <a:p>
-            <a:pPr marL="342900" indent="-342900">
-              <a:buFont typeface="+mj-lt"/>
-              <a:buAutoNum type="arabicPeriod"/>
-            </a:pPr>
-            <a:r>
-              <a:rPr lang="en-GB" sz="1600" dirty="0">
-                <a:solidFill>
-                  <a:schemeClr val="tx1"/>
-                </a:solidFill>
+              <a:t>To Implement a robust system architecture what we have learnt from our research of the latest technologies.</a:t>
+            </a:r>
+          </a:p>
+          <a:p>
+            <a:r>
+              <a:rPr lang="en-GB" sz="1800" b="0" i="0" dirty="0">
+                <a:effectLst/>
               </a:rPr>
-              <a:t>The Unity client sends the users converted speech to a python flask server, hosted on PythonAnywhere, and fed into an AIML bot to generate a text response.</a:t>
-            </a:r>
-          </a:p>
-          <a:p>
-            <a:pPr marL="342900" indent="-342900">
-              <a:buFont typeface="+mj-lt"/>
-              <a:buAutoNum type="arabicPeriod"/>
-            </a:pPr>
-            <a:r>
-              <a:rPr lang="en-GB" sz="1600" dirty="0">
-                <a:solidFill>
-                  <a:schemeClr val="tx1"/>
-                </a:solidFill>
-              </a:rPr>
-              <a:t>Once the text response is generated it is sent back to the Unity client.</a:t>
-            </a:r>
-          </a:p>
-          <a:p>
-            <a:pPr marL="342900" indent="-342900">
-              <a:buFont typeface="+mj-lt"/>
-              <a:buAutoNum type="arabicPeriod"/>
-            </a:pPr>
-            <a:r>
-              <a:rPr lang="en-GB" sz="1600" dirty="0">
-                <a:solidFill>
-                  <a:schemeClr val="tx1"/>
-                </a:solidFill>
-              </a:rPr>
-              <a:t>The Unity client sends the bot’s response to the Azure Text to Speech service.</a:t>
-            </a:r>
-          </a:p>
-          <a:p>
-            <a:pPr marL="342900" indent="-342900">
-              <a:buFont typeface="+mj-lt"/>
-              <a:buAutoNum type="arabicPeriod"/>
-            </a:pPr>
-            <a:r>
-              <a:rPr lang="en-GB" sz="1600" dirty="0">
-                <a:solidFill>
-                  <a:schemeClr val="tx1"/>
-                </a:solidFill>
-              </a:rPr>
-              <a:t>Audio is generated based on the bot’s response and sent back to Unity and played for the user.</a:t>
-            </a:r>
-          </a:p>
-          <a:p>
-            <a:pPr marL="0" indent="0">
-              <a:buNone/>
-            </a:pPr>
-            <a:endParaRPr lang="en-GB" sz="1600" dirty="0">
-              <a:solidFill>
-                <a:schemeClr val="tx1"/>
-              </a:solidFill>
+              <a:t>To create an application that we, as developers, were happy with but more importantly, creating a product that met the requirements of our client.</a:t>
+            </a:r>
+            <a:endParaRPr lang="en-GB" sz="1800" dirty="0">
+              <a:cs typeface="Arial" panose="020B0604020202020204" pitchFamily="34" charset="0"/>
             </a:endParaRPr>
           </a:p>
         </p:txBody>
-      </p:sp>
-      <p:pic>
-        <p:nvPicPr>
-          <p:cNvPr id="5" name="Picture 4" descr="A screenshot of a cell phone&#10;&#10;Description automatically generated">
-            <a:extLst>
-              <a:ext uri="{FF2B5EF4-FFF2-40B4-BE49-F238E27FC236}">
-                <a16:creationId xmlns:a16="http://schemas.microsoft.com/office/drawing/2014/main" id="{127F262B-3691-458C-98A6-0DA7D970C015}"/>
-              </a:ext>
-            </a:extLst>
-          </p:cNvPr>
-          <p:cNvPicPr>
-            <a:picLocks noChangeAspect="1"/>
-          </p:cNvPicPr>
-          <p:nvPr/>
-        </p:nvPicPr>
-        <p:blipFill rotWithShape="1">
-          <a:blip r:embed="rId2"/>
-          <a:srcRect l="23047" r="19453"/>
-          <a:stretch/>
-        </p:blipFill>
-        <p:spPr>
-          <a:xfrm>
-            <a:off x="7178280" y="516825"/>
-            <a:ext cx="5013719" cy="4904719"/>
-          </a:xfrm>
-          <a:prstGeom prst="rect">
-            <a:avLst/>
-          </a:prstGeom>
-        </p:spPr>
-      </p:pic>
-      <p:sp>
-        <p:nvSpPr>
-          <p:cNvPr id="22" name="Freeform 6">
-            <a:extLst>
-              <a:ext uri="{FF2B5EF4-FFF2-40B4-BE49-F238E27FC236}">
-                <a16:creationId xmlns:a16="http://schemas.microsoft.com/office/drawing/2014/main" id="{B33DBEF2-0A54-4CCF-952F-ABFA981C6472}"/>
-              </a:ext>
-              <a:ext uri="{C183D7F6-B498-43B3-948B-1728B52AA6E4}">
-                <adec:decorative xmlns:adec="http://schemas.microsoft.com/office/drawing/2017/decorative" val="1"/>
-              </a:ext>
-            </a:extLst>
-          </p:cNvPr>
-          <p:cNvSpPr>
-            <a:spLocks noGrp="1" noRot="1" noChangeAspect="1" noMove="1" noResize="1" noEditPoints="1" noAdjustHandles="1" noChangeArrowheads="1" noChangeShapeType="1" noTextEdit="1"/>
-          </p:cNvSpPr>
-          <p:nvPr>
-            <p:extLst>
-              <p:ext uri="{386F3935-93C4-4BCD-93E2-E3B085C9AB24}">
-                <p16:designElem xmlns:p16="http://schemas.microsoft.com/office/powerpoint/2015/main" val="1"/>
-              </p:ext>
-            </p:extLst>
-          </p:nvPr>
-        </p:nvSpPr>
-        <p:spPr bwMode="auto">
-          <a:xfrm>
-            <a:off x="11784011" y="5380580"/>
-            <a:ext cx="407988" cy="819150"/>
-          </a:xfrm>
-          <a:custGeom>
-            <a:avLst/>
-            <a:gdLst/>
-            <a:ahLst/>
-            <a:cxnLst/>
-            <a:rect l="0" t="0" r="r" b="b"/>
-            <a:pathLst>
-              <a:path w="1799" h="3612">
-                <a:moveTo>
-                  <a:pt x="1799" y="0"/>
-                </a:moveTo>
-                <a:lnTo>
-                  <a:pt x="1799" y="3612"/>
-                </a:lnTo>
-                <a:lnTo>
-                  <a:pt x="1686" y="3609"/>
-                </a:lnTo>
-                <a:lnTo>
-                  <a:pt x="1574" y="3598"/>
-                </a:lnTo>
-                <a:lnTo>
-                  <a:pt x="1464" y="3581"/>
-                </a:lnTo>
-                <a:lnTo>
-                  <a:pt x="1357" y="3557"/>
-                </a:lnTo>
-                <a:lnTo>
-                  <a:pt x="1251" y="3527"/>
-                </a:lnTo>
-                <a:lnTo>
-                  <a:pt x="1150" y="3490"/>
-                </a:lnTo>
-                <a:lnTo>
-                  <a:pt x="1050" y="3448"/>
-                </a:lnTo>
-                <a:lnTo>
-                  <a:pt x="953" y="3401"/>
-                </a:lnTo>
-                <a:lnTo>
-                  <a:pt x="860" y="3347"/>
-                </a:lnTo>
-                <a:lnTo>
-                  <a:pt x="771" y="3289"/>
-                </a:lnTo>
-                <a:lnTo>
-                  <a:pt x="686" y="3224"/>
-                </a:lnTo>
-                <a:lnTo>
-                  <a:pt x="604" y="3156"/>
-                </a:lnTo>
-                <a:lnTo>
-                  <a:pt x="527" y="3083"/>
-                </a:lnTo>
-                <a:lnTo>
-                  <a:pt x="454" y="3005"/>
-                </a:lnTo>
-                <a:lnTo>
-                  <a:pt x="386" y="2923"/>
-                </a:lnTo>
-                <a:lnTo>
-                  <a:pt x="323" y="2838"/>
-                </a:lnTo>
-                <a:lnTo>
-                  <a:pt x="265" y="2748"/>
-                </a:lnTo>
-                <a:lnTo>
-                  <a:pt x="211" y="2655"/>
-                </a:lnTo>
-                <a:lnTo>
-                  <a:pt x="163" y="2559"/>
-                </a:lnTo>
-                <a:lnTo>
-                  <a:pt x="121" y="2459"/>
-                </a:lnTo>
-                <a:lnTo>
-                  <a:pt x="85" y="2356"/>
-                </a:lnTo>
-                <a:lnTo>
-                  <a:pt x="55" y="2251"/>
-                </a:lnTo>
-                <a:lnTo>
-                  <a:pt x="32" y="2143"/>
-                </a:lnTo>
-                <a:lnTo>
-                  <a:pt x="14" y="2033"/>
-                </a:lnTo>
-                <a:lnTo>
-                  <a:pt x="4" y="1920"/>
-                </a:lnTo>
-                <a:lnTo>
-                  <a:pt x="0" y="1806"/>
-                </a:lnTo>
-                <a:lnTo>
-                  <a:pt x="4" y="1692"/>
-                </a:lnTo>
-                <a:lnTo>
-                  <a:pt x="14" y="1580"/>
-                </a:lnTo>
-                <a:lnTo>
-                  <a:pt x="32" y="1469"/>
-                </a:lnTo>
-                <a:lnTo>
-                  <a:pt x="55" y="1362"/>
-                </a:lnTo>
-                <a:lnTo>
-                  <a:pt x="85" y="1256"/>
-                </a:lnTo>
-                <a:lnTo>
-                  <a:pt x="121" y="1154"/>
-                </a:lnTo>
-                <a:lnTo>
-                  <a:pt x="163" y="1054"/>
-                </a:lnTo>
-                <a:lnTo>
-                  <a:pt x="211" y="958"/>
-                </a:lnTo>
-                <a:lnTo>
-                  <a:pt x="265" y="864"/>
-                </a:lnTo>
-                <a:lnTo>
-                  <a:pt x="323" y="774"/>
-                </a:lnTo>
-                <a:lnTo>
-                  <a:pt x="386" y="689"/>
-                </a:lnTo>
-                <a:lnTo>
-                  <a:pt x="454" y="607"/>
-                </a:lnTo>
-                <a:lnTo>
-                  <a:pt x="527" y="529"/>
-                </a:lnTo>
-                <a:lnTo>
-                  <a:pt x="604" y="456"/>
-                </a:lnTo>
-                <a:lnTo>
-                  <a:pt x="686" y="388"/>
-                </a:lnTo>
-                <a:lnTo>
-                  <a:pt x="771" y="325"/>
-                </a:lnTo>
-                <a:lnTo>
-                  <a:pt x="860" y="266"/>
-                </a:lnTo>
-                <a:lnTo>
-                  <a:pt x="953" y="212"/>
-                </a:lnTo>
-                <a:lnTo>
-                  <a:pt x="1050" y="164"/>
-                </a:lnTo>
-                <a:lnTo>
-                  <a:pt x="1150" y="122"/>
-                </a:lnTo>
-                <a:lnTo>
-                  <a:pt x="1251" y="85"/>
-                </a:lnTo>
-                <a:lnTo>
-                  <a:pt x="1357" y="55"/>
-                </a:lnTo>
-                <a:lnTo>
-                  <a:pt x="1464" y="32"/>
-                </a:lnTo>
-                <a:lnTo>
-                  <a:pt x="1574" y="14"/>
-                </a:lnTo>
-                <a:lnTo>
-                  <a:pt x="1686" y="5"/>
-                </a:lnTo>
-                <a:lnTo>
-                  <a:pt x="1799" y="0"/>
-                </a:lnTo>
-                <a:close/>
-              </a:path>
-            </a:pathLst>
-          </a:custGeom>
-          <a:solidFill>
-            <a:schemeClr val="tx1"/>
-          </a:solidFill>
-          <a:ln w="0">
-            <a:noFill/>
-            <a:prstDash val="solid"/>
-            <a:round/>
-            <a:headEnd/>
-            <a:tailEnd/>
-          </a:ln>
-        </p:spPr>
       </p:sp>
     </p:spTree>
     <p:extLst>
       <p:ext uri="{BB962C8B-B14F-4D97-AF65-F5344CB8AC3E}">
-        <p14:creationId xmlns:p14="http://schemas.microsoft.com/office/powerpoint/2010/main" val="1337649999"/>
+        <p14:creationId xmlns:p14="http://schemas.microsoft.com/office/powerpoint/2010/main" val="48547478"/>
       </p:ext>
     </p:extLst>
   </p:cSld>
@@ -6553,7 +6223,7 @@
         </p:nvSpPr>
         <p:spPr>
           <a:xfrm>
-            <a:off x="762000" y="559678"/>
+            <a:off x="248817" y="2799025"/>
             <a:ext cx="3833906" cy="1759316"/>
           </a:xfrm>
         </p:spPr>
@@ -6564,133 +6234,12 @@
           <a:lstStyle/>
           <a:p>
             <a:r>
-              <a:rPr lang="en-GB" sz="4000">
+              <a:rPr lang="en-GB" sz="4000" dirty="0">
                 <a:solidFill>
                   <a:schemeClr val="tx1"/>
                 </a:solidFill>
               </a:rPr>
               <a:t>System Design</a:t>
-            </a:r>
-          </a:p>
-        </p:txBody>
-      </p:sp>
-      <p:sp>
-        <p:nvSpPr>
-          <p:cNvPr id="3" name="Content Placeholder 2"/>
-          <p:cNvSpPr>
-            <a:spLocks noGrp="1"/>
-          </p:cNvSpPr>
-          <p:nvPr>
-            <p:ph idx="1"/>
-          </p:nvPr>
-        </p:nvSpPr>
-        <p:spPr>
-          <a:xfrm>
-            <a:off x="762000" y="1512420"/>
-            <a:ext cx="6534539" cy="3805304"/>
-          </a:xfrm>
-        </p:spPr>
-        <p:txBody>
-          <a:bodyPr>
-            <a:normAutofit/>
-          </a:bodyPr>
-          <a:lstStyle/>
-          <a:p>
-            <a:r>
-              <a:rPr lang="en-GB" sz="1600" dirty="0">
-                <a:solidFill>
-                  <a:schemeClr val="tx1"/>
-                </a:solidFill>
-              </a:rPr>
-              <a:t>Technologies In Final Build:</a:t>
-            </a:r>
-          </a:p>
-          <a:p>
-            <a:pPr lvl="1"/>
-            <a:r>
-              <a:rPr lang="en-GB" sz="1600" dirty="0">
-                <a:solidFill>
-                  <a:schemeClr val="tx1"/>
-                </a:solidFill>
-              </a:rPr>
-              <a:t>Unity: Creating a 3D environment</a:t>
-            </a:r>
-          </a:p>
-          <a:p>
-            <a:pPr lvl="1"/>
-            <a:r>
-              <a:rPr lang="en-GB" sz="1600" dirty="0">
-                <a:solidFill>
-                  <a:schemeClr val="tx1"/>
-                </a:solidFill>
-              </a:rPr>
-              <a:t>Oculus Quest: Platform we were developing for</a:t>
-            </a:r>
-          </a:p>
-          <a:p>
-            <a:pPr lvl="1"/>
-            <a:r>
-              <a:rPr lang="en-GB" sz="1600" dirty="0">
-                <a:solidFill>
-                  <a:schemeClr val="tx1"/>
-                </a:solidFill>
-              </a:rPr>
-              <a:t>Azure Services: Convert Speech to Text and vice versa</a:t>
-            </a:r>
-          </a:p>
-          <a:p>
-            <a:pPr lvl="1"/>
-            <a:r>
-              <a:rPr lang="en-GB" sz="1600" dirty="0">
-                <a:solidFill>
-                  <a:schemeClr val="tx1"/>
-                </a:solidFill>
-              </a:rPr>
-              <a:t>AIML: Create a diction for the bot</a:t>
-            </a:r>
-          </a:p>
-          <a:p>
-            <a:pPr lvl="1"/>
-            <a:r>
-              <a:rPr lang="en-GB" sz="1600" dirty="0">
-                <a:solidFill>
-                  <a:schemeClr val="tx1"/>
-                </a:solidFill>
-              </a:rPr>
-              <a:t>Flask: Handle requests and host the AIML bot</a:t>
-            </a:r>
-          </a:p>
-          <a:p>
-            <a:pPr lvl="1"/>
-            <a:r>
-              <a:rPr lang="en-GB" sz="1600" dirty="0">
-                <a:solidFill>
-                  <a:schemeClr val="tx1"/>
-                </a:solidFill>
-              </a:rPr>
-              <a:t>HTTP web protocol : Pass data the Flask server</a:t>
-            </a:r>
-          </a:p>
-          <a:p>
-            <a:pPr lvl="1"/>
-            <a:r>
-              <a:rPr lang="en-GB" sz="1600" dirty="0">
-                <a:solidFill>
-                  <a:schemeClr val="tx1"/>
-                </a:solidFill>
-              </a:rPr>
-              <a:t>PythonAnywhere: Host our flask server publicly</a:t>
-            </a:r>
-          </a:p>
-          <a:p>
-            <a:pPr lvl="1"/>
-            <a:r>
-              <a:rPr lang="en-GB" sz="1600" dirty="0">
-                <a:solidFill>
-                  <a:schemeClr val="tx1"/>
-                </a:solidFill>
-              </a:rPr>
-              <a:t>MongoDB: Store training session data.</a:t>
             </a:r>
           </a:p>
         </p:txBody>
@@ -6716,14 +6265,410 @@
         </p:blipFill>
         <p:spPr>
           <a:xfrm>
-            <a:off x="7178280" y="516825"/>
-            <a:ext cx="5013719" cy="4904719"/>
+            <a:off x="5936828" y="568968"/>
+            <a:ext cx="5847183" cy="5720063"/>
           </a:xfrm>
           <a:prstGeom prst="rect">
             <a:avLst/>
           </a:prstGeom>
         </p:spPr>
       </p:pic>
+      <p:sp>
+        <p:nvSpPr>
+          <p:cNvPr id="22" name="Freeform 6">
+            <a:extLst>
+              <a:ext uri="{FF2B5EF4-FFF2-40B4-BE49-F238E27FC236}">
+                <a16:creationId xmlns:a16="http://schemas.microsoft.com/office/drawing/2014/main" id="{B33DBEF2-0A54-4CCF-952F-ABFA981C6472}"/>
+              </a:ext>
+              <a:ext uri="{C183D7F6-B498-43B3-948B-1728B52AA6E4}">
+                <adec:decorative xmlns:adec="http://schemas.microsoft.com/office/drawing/2017/decorative" val="1"/>
+              </a:ext>
+            </a:extLst>
+          </p:cNvPr>
+          <p:cNvSpPr>
+            <a:spLocks noGrp="1" noRot="1" noChangeAspect="1" noMove="1" noResize="1" noEditPoints="1" noAdjustHandles="1" noChangeArrowheads="1" noChangeShapeType="1" noTextEdit="1"/>
+          </p:cNvSpPr>
+          <p:nvPr>
+            <p:extLst>
+              <p:ext uri="{386F3935-93C4-4BCD-93E2-E3B085C9AB24}">
+                <p16:designElem xmlns:p16="http://schemas.microsoft.com/office/powerpoint/2015/main" val="1"/>
+              </p:ext>
+            </p:extLst>
+          </p:nvPr>
+        </p:nvSpPr>
+        <p:spPr bwMode="auto">
+          <a:xfrm>
+            <a:off x="11784011" y="5380580"/>
+            <a:ext cx="407988" cy="819150"/>
+          </a:xfrm>
+          <a:custGeom>
+            <a:avLst/>
+            <a:gdLst/>
+            <a:ahLst/>
+            <a:cxnLst/>
+            <a:rect l="0" t="0" r="r" b="b"/>
+            <a:pathLst>
+              <a:path w="1799" h="3612">
+                <a:moveTo>
+                  <a:pt x="1799" y="0"/>
+                </a:moveTo>
+                <a:lnTo>
+                  <a:pt x="1799" y="3612"/>
+                </a:lnTo>
+                <a:lnTo>
+                  <a:pt x="1686" y="3609"/>
+                </a:lnTo>
+                <a:lnTo>
+                  <a:pt x="1574" y="3598"/>
+                </a:lnTo>
+                <a:lnTo>
+                  <a:pt x="1464" y="3581"/>
+                </a:lnTo>
+                <a:lnTo>
+                  <a:pt x="1357" y="3557"/>
+                </a:lnTo>
+                <a:lnTo>
+                  <a:pt x="1251" y="3527"/>
+                </a:lnTo>
+                <a:lnTo>
+                  <a:pt x="1150" y="3490"/>
+                </a:lnTo>
+                <a:lnTo>
+                  <a:pt x="1050" y="3448"/>
+                </a:lnTo>
+                <a:lnTo>
+                  <a:pt x="953" y="3401"/>
+                </a:lnTo>
+                <a:lnTo>
+                  <a:pt x="860" y="3347"/>
+                </a:lnTo>
+                <a:lnTo>
+                  <a:pt x="771" y="3289"/>
+                </a:lnTo>
+                <a:lnTo>
+                  <a:pt x="686" y="3224"/>
+                </a:lnTo>
+                <a:lnTo>
+                  <a:pt x="604" y="3156"/>
+                </a:lnTo>
+                <a:lnTo>
+                  <a:pt x="527" y="3083"/>
+                </a:lnTo>
+                <a:lnTo>
+                  <a:pt x="454" y="3005"/>
+                </a:lnTo>
+                <a:lnTo>
+                  <a:pt x="386" y="2923"/>
+                </a:lnTo>
+                <a:lnTo>
+                  <a:pt x="323" y="2838"/>
+                </a:lnTo>
+                <a:lnTo>
+                  <a:pt x="265" y="2748"/>
+                </a:lnTo>
+                <a:lnTo>
+                  <a:pt x="211" y="2655"/>
+                </a:lnTo>
+                <a:lnTo>
+                  <a:pt x="163" y="2559"/>
+                </a:lnTo>
+                <a:lnTo>
+                  <a:pt x="121" y="2459"/>
+                </a:lnTo>
+                <a:lnTo>
+                  <a:pt x="85" y="2356"/>
+                </a:lnTo>
+                <a:lnTo>
+                  <a:pt x="55" y="2251"/>
+                </a:lnTo>
+                <a:lnTo>
+                  <a:pt x="32" y="2143"/>
+                </a:lnTo>
+                <a:lnTo>
+                  <a:pt x="14" y="2033"/>
+                </a:lnTo>
+                <a:lnTo>
+                  <a:pt x="4" y="1920"/>
+                </a:lnTo>
+                <a:lnTo>
+                  <a:pt x="0" y="1806"/>
+                </a:lnTo>
+                <a:lnTo>
+                  <a:pt x="4" y="1692"/>
+                </a:lnTo>
+                <a:lnTo>
+                  <a:pt x="14" y="1580"/>
+                </a:lnTo>
+                <a:lnTo>
+                  <a:pt x="32" y="1469"/>
+                </a:lnTo>
+                <a:lnTo>
+                  <a:pt x="55" y="1362"/>
+                </a:lnTo>
+                <a:lnTo>
+                  <a:pt x="85" y="1256"/>
+                </a:lnTo>
+                <a:lnTo>
+                  <a:pt x="121" y="1154"/>
+                </a:lnTo>
+                <a:lnTo>
+                  <a:pt x="163" y="1054"/>
+                </a:lnTo>
+                <a:lnTo>
+                  <a:pt x="211" y="958"/>
+                </a:lnTo>
+                <a:lnTo>
+                  <a:pt x="265" y="864"/>
+                </a:lnTo>
+                <a:lnTo>
+                  <a:pt x="323" y="774"/>
+                </a:lnTo>
+                <a:lnTo>
+                  <a:pt x="386" y="689"/>
+                </a:lnTo>
+                <a:lnTo>
+                  <a:pt x="454" y="607"/>
+                </a:lnTo>
+                <a:lnTo>
+                  <a:pt x="527" y="529"/>
+                </a:lnTo>
+                <a:lnTo>
+                  <a:pt x="604" y="456"/>
+                </a:lnTo>
+                <a:lnTo>
+                  <a:pt x="686" y="388"/>
+                </a:lnTo>
+                <a:lnTo>
+                  <a:pt x="771" y="325"/>
+                </a:lnTo>
+                <a:lnTo>
+                  <a:pt x="860" y="266"/>
+                </a:lnTo>
+                <a:lnTo>
+                  <a:pt x="953" y="212"/>
+                </a:lnTo>
+                <a:lnTo>
+                  <a:pt x="1050" y="164"/>
+                </a:lnTo>
+                <a:lnTo>
+                  <a:pt x="1150" y="122"/>
+                </a:lnTo>
+                <a:lnTo>
+                  <a:pt x="1251" y="85"/>
+                </a:lnTo>
+                <a:lnTo>
+                  <a:pt x="1357" y="55"/>
+                </a:lnTo>
+                <a:lnTo>
+                  <a:pt x="1464" y="32"/>
+                </a:lnTo>
+                <a:lnTo>
+                  <a:pt x="1574" y="14"/>
+                </a:lnTo>
+                <a:lnTo>
+                  <a:pt x="1686" y="5"/>
+                </a:lnTo>
+                <a:lnTo>
+                  <a:pt x="1799" y="0"/>
+                </a:lnTo>
+                <a:close/>
+              </a:path>
+            </a:pathLst>
+          </a:custGeom>
+          <a:solidFill>
+            <a:schemeClr val="tx1"/>
+          </a:solidFill>
+          <a:ln w="0">
+            <a:noFill/>
+            <a:prstDash val="solid"/>
+            <a:round/>
+            <a:headEnd/>
+            <a:tailEnd/>
+          </a:ln>
+        </p:spPr>
+      </p:sp>
+    </p:spTree>
+    <p:extLst>
+      <p:ext uri="{BB962C8B-B14F-4D97-AF65-F5344CB8AC3E}">
+        <p14:creationId xmlns:p14="http://schemas.microsoft.com/office/powerpoint/2010/main" val="1337649999"/>
+      </p:ext>
+    </p:extLst>
+  </p:cSld>
+  <p:clrMapOvr>
+    <a:overrideClrMapping bg1="dk1" tx1="lt1" bg2="dk2" tx2="lt2" accent1="accent1" accent2="accent2" accent3="accent3" accent4="accent4" accent5="accent5" accent6="accent6" hlink="hlink" folHlink="folHlink"/>
+  </p:clrMapOvr>
+</p:sld>
+</file>
+
+<file path=ppt/slides/slide6.xml><?xml version="1.0" encoding="utf-8"?>
+<p:sld xmlns:a="http://schemas.openxmlformats.org/drawingml/2006/main" xmlns:r="http://schemas.openxmlformats.org/officeDocument/2006/relationships" xmlns:p="http://schemas.openxmlformats.org/presentationml/2006/main">
+  <p:cSld>
+    <p:bg>
+      <p:bgPr>
+        <a:solidFill>
+          <a:schemeClr val="bg1"/>
+        </a:solidFill>
+        <a:effectLst/>
+      </p:bgPr>
+    </p:bg>
+    <p:spTree>
+      <p:nvGrpSpPr>
+        <p:cNvPr id="1" name=""/>
+        <p:cNvGrpSpPr/>
+        <p:nvPr/>
+      </p:nvGrpSpPr>
+      <p:grpSpPr>
+        <a:xfrm>
+          <a:off x="0" y="0"/>
+          <a:ext cx="0" cy="0"/>
+          <a:chOff x="0" y="0"/>
+          <a:chExt cx="0" cy="0"/>
+        </a:xfrm>
+      </p:grpSpPr>
+      <p:sp>
+        <p:nvSpPr>
+          <p:cNvPr id="2" name="Title 1"/>
+          <p:cNvSpPr>
+            <a:spLocks noGrp="1"/>
+          </p:cNvSpPr>
+          <p:nvPr>
+            <p:ph type="title"/>
+          </p:nvPr>
+        </p:nvSpPr>
+        <p:spPr>
+          <a:xfrm>
+            <a:off x="761999" y="559678"/>
+            <a:ext cx="7784842" cy="952742"/>
+          </a:xfrm>
+        </p:spPr>
+        <p:txBody>
+          <a:bodyPr>
+            <a:normAutofit/>
+          </a:bodyPr>
+          <a:lstStyle/>
+          <a:p>
+            <a:r>
+              <a:rPr lang="en-GB" sz="4000" dirty="0">
+                <a:solidFill>
+                  <a:schemeClr val="tx1"/>
+                </a:solidFill>
+              </a:rPr>
+              <a:t>Technologies Used</a:t>
+            </a:r>
+          </a:p>
+        </p:txBody>
+      </p:sp>
+      <p:sp>
+        <p:nvSpPr>
+          <p:cNvPr id="3" name="Content Placeholder 2"/>
+          <p:cNvSpPr>
+            <a:spLocks noGrp="1"/>
+          </p:cNvSpPr>
+          <p:nvPr>
+            <p:ph idx="1"/>
+          </p:nvPr>
+        </p:nvSpPr>
+        <p:spPr>
+          <a:xfrm>
+            <a:off x="762000" y="1512420"/>
+            <a:ext cx="6534539" cy="3805304"/>
+          </a:xfrm>
+        </p:spPr>
+        <p:txBody>
+          <a:bodyPr>
+            <a:noAutofit/>
+          </a:bodyPr>
+          <a:lstStyle/>
+          <a:p>
+            <a:pPr lvl="1"/>
+            <a:r>
+              <a:rPr lang="en-GB" sz="2000" dirty="0">
+                <a:solidFill>
+                  <a:schemeClr val="tx1"/>
+                </a:solidFill>
+              </a:rPr>
+              <a:t>Unity: Creating a 3D environment</a:t>
+            </a:r>
+          </a:p>
+          <a:p>
+            <a:pPr lvl="1"/>
+            <a:r>
+              <a:rPr lang="en-GB" sz="2000" dirty="0">
+                <a:solidFill>
+                  <a:schemeClr val="tx1"/>
+                </a:solidFill>
+              </a:rPr>
+              <a:t>Oculus Quest: Platform we were developing for</a:t>
+            </a:r>
+          </a:p>
+          <a:p>
+            <a:pPr lvl="1"/>
+            <a:r>
+              <a:rPr lang="en-GB" sz="2000" dirty="0">
+                <a:solidFill>
+                  <a:schemeClr val="tx1"/>
+                </a:solidFill>
+              </a:rPr>
+              <a:t>Azure Services: Convert Speech to Text and vice versa</a:t>
+            </a:r>
+          </a:p>
+          <a:p>
+            <a:pPr lvl="1"/>
+            <a:r>
+              <a:rPr lang="en-GB" sz="2000" dirty="0">
+                <a:solidFill>
+                  <a:schemeClr val="tx1"/>
+                </a:solidFill>
+              </a:rPr>
+              <a:t>AIML: Create a diction for the bot</a:t>
+            </a:r>
+          </a:p>
+          <a:p>
+            <a:pPr lvl="1"/>
+            <a:r>
+              <a:rPr lang="en-GB" sz="2000" dirty="0">
+                <a:solidFill>
+                  <a:schemeClr val="tx1"/>
+                </a:solidFill>
+              </a:rPr>
+              <a:t>Flask: Handle requests and host the AIML bot</a:t>
+            </a:r>
+          </a:p>
+          <a:p>
+            <a:pPr lvl="1"/>
+            <a:r>
+              <a:rPr lang="en-GB" sz="2000" dirty="0">
+                <a:solidFill>
+                  <a:schemeClr val="tx1"/>
+                </a:solidFill>
+              </a:rPr>
+              <a:t>HTTP web protocol : Pass data the Flask server</a:t>
+            </a:r>
+          </a:p>
+          <a:p>
+            <a:pPr lvl="1"/>
+            <a:r>
+              <a:rPr lang="en-GB" sz="2000" dirty="0">
+                <a:solidFill>
+                  <a:schemeClr val="tx1"/>
+                </a:solidFill>
+              </a:rPr>
+              <a:t>PythonAnywhere: Host our flask server publicly</a:t>
+            </a:r>
+          </a:p>
+          <a:p>
+            <a:pPr lvl="1"/>
+            <a:r>
+              <a:rPr lang="en-GB" sz="2000" dirty="0">
+                <a:solidFill>
+                  <a:schemeClr val="tx1"/>
+                </a:solidFill>
+              </a:rPr>
+              <a:t>MongoDB: Store training session data.</a:t>
+            </a:r>
+          </a:p>
+        </p:txBody>
+      </p:sp>
     </p:spTree>
     <p:extLst>
       <p:ext uri="{BB962C8B-B14F-4D97-AF65-F5344CB8AC3E}">
@@ -6737,7 +6682,7 @@
 </p:sld>
 </file>
 
-<file path=ppt/slides/slide6.xml><?xml version="1.0" encoding="utf-8"?>
+<file path=ppt/slides/slide7.xml><?xml version="1.0" encoding="utf-8"?>
 <p:sld xmlns:a="http://schemas.openxmlformats.org/drawingml/2006/main" xmlns:r="http://schemas.openxmlformats.org/officeDocument/2006/relationships" xmlns:p="http://schemas.openxmlformats.org/presentationml/2006/main">
   <p:cSld>
     <p:bg>
@@ -7335,7 +7280,7 @@
 </p:sld>
 </file>
 
-<file path=ppt/slides/slide7.xml><?xml version="1.0" encoding="utf-8"?>
+<file path=ppt/slides/slide8.xml><?xml version="1.0" encoding="utf-8"?>
 <p:sld xmlns:a="http://schemas.openxmlformats.org/drawingml/2006/main" xmlns:r="http://schemas.openxmlformats.org/officeDocument/2006/relationships" xmlns:p="http://schemas.openxmlformats.org/presentationml/2006/main">
   <p:cSld>
     <p:bg>

</xml_diff>